<commit_message>
Update Slide & Report: Cap nhat cong viec 29/12/2020
</commit_message>
<xml_diff>
--- a/Project_Slide.pptx
+++ b/Project_Slide.pptx
@@ -13,6 +13,7 @@
     <p:sldId id="261" r:id="rId7"/>
     <p:sldId id="262" r:id="rId8"/>
     <p:sldId id="263" r:id="rId9"/>
+    <p:sldId id="264" r:id="rId10"/>
   </p:sldIdLst>
   <p:sldSz cx="12192000" cy="6858000"/>
   <p:notesSz cx="6858000" cy="9144000"/>
@@ -111,6 +112,11 @@
       </a:defRPr>
     </a:lvl9pPr>
   </p:defaultTextStyle>
+  <p:extLst>
+    <p:ext uri="{EFAFB233-063F-42B5-8137-9DF3F51BA10A}">
+      <p15:sldGuideLst xmlns:p15="http://schemas.microsoft.com/office/powerpoint/2012/main"/>
+    </p:ext>
+  </p:extLst>
 </p:presentation>
 </file>
 
@@ -245,7 +251,7 @@
           <a:p>
             <a:fld id="{EA0C0817-A112-4847-8014-A94B7D2A4EA3}" type="datetime1">
               <a:rPr lang="en-US" smtClean="0"/>
-              <a:t>12/28/2020</a:t>
+              <a:t>12/29/2020</a:t>
             </a:fld>
             <a:endParaRPr lang="en-US" dirty="0"/>
           </a:p>
@@ -415,7 +421,7 @@
           <a:p>
             <a:fld id="{134F40B7-36AB-4376-BE14-EF7004D79BB9}" type="datetime1">
               <a:rPr lang="en-US" smtClean="0"/>
-              <a:t>12/28/2020</a:t>
+              <a:t>12/29/2020</a:t>
             </a:fld>
             <a:endParaRPr lang="en-US"/>
           </a:p>
@@ -595,7 +601,7 @@
           <a:p>
             <a:fld id="{FF87CAB8-DCAE-46A5-AADA-B3FAD11A54E0}" type="datetime1">
               <a:rPr lang="en-US" smtClean="0"/>
-              <a:t>12/28/2020</a:t>
+              <a:t>12/29/2020</a:t>
             </a:fld>
             <a:endParaRPr lang="en-US"/>
           </a:p>
@@ -765,7 +771,7 @@
           <a:p>
             <a:fld id="{7332B432-ACDA-4023-A761-2BAB76577B62}" type="datetime1">
               <a:rPr lang="en-US" smtClean="0"/>
-              <a:t>12/28/2020</a:t>
+              <a:t>12/29/2020</a:t>
             </a:fld>
             <a:endParaRPr lang="en-US"/>
           </a:p>
@@ -1011,7 +1017,7 @@
           <a:p>
             <a:fld id="{D9C646AA-F36E-4540-911D-FFFC0A0EF24A}" type="datetime1">
               <a:rPr lang="en-US" smtClean="0"/>
-              <a:t>12/28/2020</a:t>
+              <a:t>12/29/2020</a:t>
             </a:fld>
             <a:endParaRPr lang="en-US" dirty="0"/>
           </a:p>
@@ -1243,7 +1249,7 @@
           <a:p>
             <a:fld id="{69186D26-FA5F-4637-B602-B7C2DC34CFD4}" type="datetime1">
               <a:rPr lang="en-US" smtClean="0"/>
-              <a:t>12/28/2020</a:t>
+              <a:t>12/29/2020</a:t>
             </a:fld>
             <a:endParaRPr lang="en-US"/>
           </a:p>
@@ -1610,7 +1616,7 @@
           <a:p>
             <a:fld id="{F6FA2B21-3FCD-4721-B95C-427943F61125}" type="datetime1">
               <a:rPr lang="en-US" smtClean="0"/>
-              <a:t>12/28/2020</a:t>
+              <a:t>12/29/2020</a:t>
             </a:fld>
             <a:endParaRPr lang="en-US"/>
           </a:p>
@@ -1729,7 +1735,7 @@
           <a:p>
             <a:fld id="{F9A96C99-B8F8-4528-BD05-0E16E943DC09}" type="datetime1">
               <a:rPr lang="en-US" smtClean="0"/>
-              <a:t>12/28/2020</a:t>
+              <a:t>12/29/2020</a:t>
             </a:fld>
             <a:endParaRPr lang="en-US"/>
           </a:p>
@@ -1824,7 +1830,7 @@
           <a:p>
             <a:fld id="{03636942-C211-4B28-8DBD-C953E00AF71B}" type="datetime1">
               <a:rPr lang="en-US" smtClean="0"/>
-              <a:t>12/28/2020</a:t>
+              <a:t>12/29/2020</a:t>
             </a:fld>
             <a:endParaRPr lang="en-US"/>
           </a:p>
@@ -2101,7 +2107,7 @@
           <a:p>
             <a:fld id="{7E8D12A6-918A-48BD-8CB9-CA713993B0EA}" type="datetime1">
               <a:rPr lang="en-US" smtClean="0"/>
-              <a:t>12/28/2020</a:t>
+              <a:t>12/29/2020</a:t>
             </a:fld>
             <a:endParaRPr lang="en-US"/>
           </a:p>
@@ -2359,7 +2365,7 @@
             <a:fld id="{E778CE86-875F-4587-BCF6-FA054AFC0D53}" type="datetime1">
               <a:rPr lang="en-US" smtClean="0"/>
               <a:pPr/>
-              <a:t>12/28/2020</a:t>
+              <a:t>12/29/2020</a:t>
             </a:fld>
             <a:endParaRPr lang="en-US" dirty="0"/>
           </a:p>
@@ -2573,7 +2579,7 @@
           <a:p>
             <a:fld id="{F6FA2B21-3FCD-4721-B95C-427943F61125}" type="datetime1">
               <a:rPr lang="en-US" smtClean="0"/>
-              <a:t>12/28/2020</a:t>
+              <a:t>12/29/2020</a:t>
             </a:fld>
             <a:endParaRPr lang="en-US"/>
           </a:p>
@@ -3665,15 +3671,6 @@
               </a:lnSpc>
               <a:buNone/>
             </a:pPr>
-            <a:endParaRPr lang="en-US" dirty="0"/>
-          </a:p>
-          <a:p>
-            <a:pPr marL="0" indent="0">
-              <a:lnSpc>
-                <a:spcPct val="150000"/>
-              </a:lnSpc>
-              <a:buNone/>
-            </a:pPr>
             <a:r>
               <a:rPr lang="en-US" dirty="0">
                 <a:sym typeface="Wingdings" panose="05000000000000000000" pitchFamily="2" charset="2"/>
@@ -3779,6 +3776,109 @@
               </a:rPr>
               <a:t> ra</a:t>
             </a:r>
+          </a:p>
+          <a:p>
+            <a:pPr marL="0" indent="0">
+              <a:lnSpc>
+                <a:spcPct val="150000"/>
+              </a:lnSpc>
+              <a:buNone/>
+            </a:pPr>
+            <a:r>
+              <a:rPr lang="en-US" dirty="0">
+                <a:sym typeface="Wingdings" panose="05000000000000000000" pitchFamily="2" charset="2"/>
+              </a:rPr>
+              <a:t>6. </a:t>
+            </a:r>
+            <a:r>
+              <a:rPr lang="en-US" dirty="0" err="1">
+                <a:sym typeface="Wingdings" panose="05000000000000000000" pitchFamily="2" charset="2"/>
+              </a:rPr>
+              <a:t>Truyền</a:t>
+            </a:r>
+            <a:r>
+              <a:rPr lang="en-US" dirty="0">
+                <a:sym typeface="Wingdings" panose="05000000000000000000" pitchFamily="2" charset="2"/>
+              </a:rPr>
+              <a:t> </a:t>
+            </a:r>
+            <a:r>
+              <a:rPr lang="en-US" dirty="0" err="1">
+                <a:sym typeface="Wingdings" panose="05000000000000000000" pitchFamily="2" charset="2"/>
+              </a:rPr>
+              <a:t>thông</a:t>
+            </a:r>
+            <a:r>
+              <a:rPr lang="en-US" dirty="0">
+                <a:sym typeface="Wingdings" panose="05000000000000000000" pitchFamily="2" charset="2"/>
+              </a:rPr>
+              <a:t> </a:t>
+            </a:r>
+            <a:r>
+              <a:rPr lang="en-US" dirty="0" err="1">
+                <a:sym typeface="Wingdings" panose="05000000000000000000" pitchFamily="2" charset="2"/>
+              </a:rPr>
+              <a:t>kết</a:t>
+            </a:r>
+            <a:r>
+              <a:rPr lang="en-US" dirty="0">
+                <a:sym typeface="Wingdings" panose="05000000000000000000" pitchFamily="2" charset="2"/>
+              </a:rPr>
+              <a:t> </a:t>
+            </a:r>
+            <a:r>
+              <a:rPr lang="en-US" dirty="0" err="1">
+                <a:sym typeface="Wingdings" panose="05000000000000000000" pitchFamily="2" charset="2"/>
+              </a:rPr>
+              <a:t>quả</a:t>
+            </a:r>
+            <a:r>
+              <a:rPr lang="en-US" dirty="0">
+                <a:sym typeface="Wingdings" panose="05000000000000000000" pitchFamily="2" charset="2"/>
+              </a:rPr>
+              <a:t>, </a:t>
+            </a:r>
+            <a:r>
+              <a:rPr lang="en-US" dirty="0" err="1">
+                <a:sym typeface="Wingdings" panose="05000000000000000000" pitchFamily="2" charset="2"/>
+              </a:rPr>
+              <a:t>đưa</a:t>
+            </a:r>
+            <a:r>
+              <a:rPr lang="en-US" dirty="0">
+                <a:sym typeface="Wingdings" panose="05000000000000000000" pitchFamily="2" charset="2"/>
+              </a:rPr>
+              <a:t> ra </a:t>
+            </a:r>
+            <a:r>
+              <a:rPr lang="en-US" dirty="0" err="1">
+                <a:sym typeface="Wingdings" panose="05000000000000000000" pitchFamily="2" charset="2"/>
+              </a:rPr>
+              <a:t>quyết</a:t>
+            </a:r>
+            <a:r>
+              <a:rPr lang="en-US" dirty="0">
+                <a:sym typeface="Wingdings" panose="05000000000000000000" pitchFamily="2" charset="2"/>
+              </a:rPr>
+              <a:t> </a:t>
+            </a:r>
+            <a:r>
+              <a:rPr lang="en-US" dirty="0" err="1">
+                <a:sym typeface="Wingdings" panose="05000000000000000000" pitchFamily="2" charset="2"/>
+              </a:rPr>
+              <a:t>định</a:t>
+            </a:r>
+            <a:endParaRPr lang="en-US" dirty="0">
+              <a:sym typeface="Wingdings" panose="05000000000000000000" pitchFamily="2" charset="2"/>
+            </a:endParaRPr>
+          </a:p>
+          <a:p>
+            <a:pPr marL="0" indent="0">
+              <a:lnSpc>
+                <a:spcPct val="150000"/>
+              </a:lnSpc>
+              <a:buNone/>
+            </a:pPr>
             <a:endParaRPr lang="en-US" dirty="0">
               <a:solidFill>
                 <a:srgbClr val="FF0000"/>
@@ -4431,6 +4531,91 @@
     <p:extLst>
       <p:ext uri="{BB962C8B-B14F-4D97-AF65-F5344CB8AC3E}">
         <p14:creationId xmlns:p14="http://schemas.microsoft.com/office/powerpoint/2010/main" val="2931203277"/>
+      </p:ext>
+    </p:extLst>
+  </p:cSld>
+  <p:clrMapOvr>
+    <a:masterClrMapping/>
+  </p:clrMapOvr>
+</p:sld>
+</file>
+
+<file path=ppt/slides/slide9.xml><?xml version="1.0" encoding="utf-8"?>
+<p:sld xmlns:a="http://schemas.openxmlformats.org/drawingml/2006/main" xmlns:r="http://schemas.openxmlformats.org/officeDocument/2006/relationships" xmlns:p="http://schemas.openxmlformats.org/presentationml/2006/main">
+  <p:cSld>
+    <p:spTree>
+      <p:nvGrpSpPr>
+        <p:cNvPr id="1" name=""/>
+        <p:cNvGrpSpPr/>
+        <p:nvPr/>
+      </p:nvGrpSpPr>
+      <p:grpSpPr>
+        <a:xfrm>
+          <a:off x="0" y="0"/>
+          <a:ext cx="0" cy="0"/>
+          <a:chOff x="0" y="0"/>
+          <a:chExt cx="0" cy="0"/>
+        </a:xfrm>
+      </p:grpSpPr>
+      <p:sp>
+        <p:nvSpPr>
+          <p:cNvPr id="2" name="Title 1">
+            <a:extLst>
+              <a:ext uri="{FF2B5EF4-FFF2-40B4-BE49-F238E27FC236}">
+                <a16:creationId xmlns:a16="http://schemas.microsoft.com/office/drawing/2014/main" id="{CB9CA0A3-9467-44C8-9A6A-614498D2580F}"/>
+              </a:ext>
+            </a:extLst>
+          </p:cNvPr>
+          <p:cNvSpPr>
+            <a:spLocks noGrp="1"/>
+          </p:cNvSpPr>
+          <p:nvPr>
+            <p:ph type="title"/>
+          </p:nvPr>
+        </p:nvSpPr>
+        <p:spPr/>
+        <p:txBody>
+          <a:bodyPr>
+            <a:normAutofit/>
+          </a:bodyPr>
+          <a:lstStyle/>
+          <a:p>
+            <a:r>
+              <a:rPr lang="en-US" dirty="0"/>
+              <a:t>TRUYỀN THÔNG KẾT QUẢ, ĐƯA RA QUYẾT ĐỊNH</a:t>
+            </a:r>
+          </a:p>
+        </p:txBody>
+      </p:sp>
+      <p:sp>
+        <p:nvSpPr>
+          <p:cNvPr id="3" name="Content Placeholder 2">
+            <a:extLst>
+              <a:ext uri="{FF2B5EF4-FFF2-40B4-BE49-F238E27FC236}">
+                <a16:creationId xmlns:a16="http://schemas.microsoft.com/office/drawing/2014/main" id="{3AB3627B-788E-4220-9FF4-E27AD7DAED2A}"/>
+              </a:ext>
+            </a:extLst>
+          </p:cNvPr>
+          <p:cNvSpPr>
+            <a:spLocks noGrp="1"/>
+          </p:cNvSpPr>
+          <p:nvPr>
+            <p:ph idx="1"/>
+          </p:nvPr>
+        </p:nvSpPr>
+        <p:spPr/>
+        <p:txBody>
+          <a:bodyPr/>
+          <a:lstStyle/>
+          <a:p>
+            <a:endParaRPr lang="en-US"/>
+          </a:p>
+        </p:txBody>
+      </p:sp>
+    </p:spTree>
+    <p:extLst>
+      <p:ext uri="{BB962C8B-B14F-4D97-AF65-F5344CB8AC3E}">
+        <p14:creationId xmlns:p14="http://schemas.microsoft.com/office/powerpoint/2010/main" val="3404310540"/>
       </p:ext>
     </p:extLst>
   </p:cSld>

</xml_diff>

<commit_message>
Update Project_Slide.pptx: Cập nhật Slide
</commit_message>
<xml_diff>
--- a/Project_Slide.pptx
+++ b/Project_Slide.pptx
@@ -251,7 +251,7 @@
           <a:p>
             <a:fld id="{EA0C0817-A112-4847-8014-A94B7D2A4EA3}" type="datetime1">
               <a:rPr lang="en-US" smtClean="0"/>
-              <a:t>12/29/2020</a:t>
+              <a:t>1/5/2021</a:t>
             </a:fld>
             <a:endParaRPr lang="en-US" dirty="0"/>
           </a:p>
@@ -421,7 +421,7 @@
           <a:p>
             <a:fld id="{134F40B7-36AB-4376-BE14-EF7004D79BB9}" type="datetime1">
               <a:rPr lang="en-US" smtClean="0"/>
-              <a:t>12/29/2020</a:t>
+              <a:t>1/5/2021</a:t>
             </a:fld>
             <a:endParaRPr lang="en-US"/>
           </a:p>
@@ -601,7 +601,7 @@
           <a:p>
             <a:fld id="{FF87CAB8-DCAE-46A5-AADA-B3FAD11A54E0}" type="datetime1">
               <a:rPr lang="en-US" smtClean="0"/>
-              <a:t>12/29/2020</a:t>
+              <a:t>1/5/2021</a:t>
             </a:fld>
             <a:endParaRPr lang="en-US"/>
           </a:p>
@@ -771,7 +771,7 @@
           <a:p>
             <a:fld id="{7332B432-ACDA-4023-A761-2BAB76577B62}" type="datetime1">
               <a:rPr lang="en-US" smtClean="0"/>
-              <a:t>12/29/2020</a:t>
+              <a:t>1/5/2021</a:t>
             </a:fld>
             <a:endParaRPr lang="en-US"/>
           </a:p>
@@ -1017,7 +1017,7 @@
           <a:p>
             <a:fld id="{D9C646AA-F36E-4540-911D-FFFC0A0EF24A}" type="datetime1">
               <a:rPr lang="en-US" smtClean="0"/>
-              <a:t>12/29/2020</a:t>
+              <a:t>1/5/2021</a:t>
             </a:fld>
             <a:endParaRPr lang="en-US" dirty="0"/>
           </a:p>
@@ -1249,7 +1249,7 @@
           <a:p>
             <a:fld id="{69186D26-FA5F-4637-B602-B7C2DC34CFD4}" type="datetime1">
               <a:rPr lang="en-US" smtClean="0"/>
-              <a:t>12/29/2020</a:t>
+              <a:t>1/5/2021</a:t>
             </a:fld>
             <a:endParaRPr lang="en-US"/>
           </a:p>
@@ -1616,7 +1616,7 @@
           <a:p>
             <a:fld id="{F6FA2B21-3FCD-4721-B95C-427943F61125}" type="datetime1">
               <a:rPr lang="en-US" smtClean="0"/>
-              <a:t>12/29/2020</a:t>
+              <a:t>1/5/2021</a:t>
             </a:fld>
             <a:endParaRPr lang="en-US"/>
           </a:p>
@@ -1735,7 +1735,7 @@
           <a:p>
             <a:fld id="{F9A96C99-B8F8-4528-BD05-0E16E943DC09}" type="datetime1">
               <a:rPr lang="en-US" smtClean="0"/>
-              <a:t>12/29/2020</a:t>
+              <a:t>1/5/2021</a:t>
             </a:fld>
             <a:endParaRPr lang="en-US"/>
           </a:p>
@@ -1830,7 +1830,7 @@
           <a:p>
             <a:fld id="{03636942-C211-4B28-8DBD-C953E00AF71B}" type="datetime1">
               <a:rPr lang="en-US" smtClean="0"/>
-              <a:t>12/29/2020</a:t>
+              <a:t>1/5/2021</a:t>
             </a:fld>
             <a:endParaRPr lang="en-US"/>
           </a:p>
@@ -2107,7 +2107,7 @@
           <a:p>
             <a:fld id="{7E8D12A6-918A-48BD-8CB9-CA713993B0EA}" type="datetime1">
               <a:rPr lang="en-US" smtClean="0"/>
-              <a:t>12/29/2020</a:t>
+              <a:t>1/5/2021</a:t>
             </a:fld>
             <a:endParaRPr lang="en-US"/>
           </a:p>
@@ -2365,7 +2365,7 @@
             <a:fld id="{E778CE86-875F-4587-BCF6-FA054AFC0D53}" type="datetime1">
               <a:rPr lang="en-US" smtClean="0"/>
               <a:pPr/>
-              <a:t>12/29/2020</a:t>
+              <a:t>1/5/2021</a:t>
             </a:fld>
             <a:endParaRPr lang="en-US" dirty="0"/>
           </a:p>
@@ -2579,7 +2579,7 @@
           <a:p>
             <a:fld id="{F6FA2B21-3FCD-4721-B95C-427943F61125}" type="datetime1">
               <a:rPr lang="en-US" smtClean="0"/>
-              <a:t>12/29/2020</a:t>
+              <a:t>1/5/2021</a:t>
             </a:fld>
             <a:endParaRPr lang="en-US"/>
           </a:p>
@@ -3397,42 +3397,21 @@
             <p:ph type="title"/>
           </p:nvPr>
         </p:nvSpPr>
-        <p:spPr/>
-        <p:txBody>
-          <a:bodyPr/>
-          <a:lstStyle/>
-          <a:p>
-            <a:r>
-              <a:rPr lang="en-US" dirty="0" err="1"/>
-              <a:t>Các</a:t>
-            </a:r>
-            <a:r>
-              <a:rPr lang="en-US" dirty="0"/>
-              <a:t> </a:t>
-            </a:r>
-            <a:r>
-              <a:rPr lang="en-US" dirty="0" err="1"/>
-              <a:t>bước</a:t>
-            </a:r>
-            <a:r>
-              <a:rPr lang="en-US" dirty="0"/>
-              <a:t> </a:t>
-            </a:r>
-            <a:r>
-              <a:rPr lang="en-US" dirty="0" err="1"/>
-              <a:t>của</a:t>
-            </a:r>
-            <a:r>
-              <a:rPr lang="en-US" dirty="0"/>
-              <a:t> Qui </a:t>
-            </a:r>
-            <a:r>
-              <a:rPr lang="en-US" dirty="0" err="1"/>
-              <a:t>trình</a:t>
-            </a:r>
-            <a:r>
-              <a:rPr lang="en-US" dirty="0"/>
-              <a:t> KHDL</a:t>
+        <p:spPr>
+          <a:xfrm>
+            <a:off x="838200" y="365125"/>
+            <a:ext cx="10515600" cy="1028669"/>
+          </a:xfrm>
+        </p:spPr>
+        <p:txBody>
+          <a:bodyPr>
+            <a:normAutofit/>
+          </a:bodyPr>
+          <a:lstStyle/>
+          <a:p>
+            <a:r>
+              <a:rPr lang="en-US" sz="3600" dirty="0"/>
+              <a:t>CÁC BƯỚC CỦA QUI TRÌNH KHDL</a:t>
             </a:r>
           </a:p>
         </p:txBody>
@@ -3453,10 +3432,15 @@
             <p:ph idx="1"/>
           </p:nvPr>
         </p:nvSpPr>
-        <p:spPr/>
+        <p:spPr>
+          <a:xfrm>
+            <a:off x="838200" y="1393794"/>
+            <a:ext cx="10515600" cy="4783169"/>
+          </a:xfrm>
+        </p:spPr>
         <p:txBody>
           <a:bodyPr>
-            <a:normAutofit fontScale="85000" lnSpcReduction="20000"/>
+            <a:normAutofit fontScale="92500" lnSpcReduction="10000"/>
           </a:bodyPr>
           <a:lstStyle/>
           <a:p>
@@ -3936,15 +3920,17 @@
         <p:spPr>
           <a:xfrm>
             <a:off x="838200" y="436146"/>
-            <a:ext cx="10515600" cy="1325563"/>
+            <a:ext cx="10515600" cy="886627"/>
           </a:xfrm>
         </p:spPr>
         <p:txBody>
-          <a:bodyPr/>
-          <a:lstStyle/>
-          <a:p>
-            <a:r>
-              <a:rPr lang="en-US" dirty="0"/>
+          <a:bodyPr>
+            <a:normAutofit/>
+          </a:bodyPr>
+          <a:lstStyle/>
+          <a:p>
+            <a:r>
+              <a:rPr lang="en-US" sz="3600" dirty="0"/>
               <a:t>1. ĐƯA RA CÂU HỎI CẦN TRẢ LỜI</a:t>
             </a:r>
           </a:p>
@@ -3966,9 +3952,16 @@
             <p:ph idx="1"/>
           </p:nvPr>
         </p:nvSpPr>
-        <p:spPr/>
-        <p:txBody>
-          <a:bodyPr/>
+        <p:spPr>
+          <a:xfrm>
+            <a:off x="838200" y="1322773"/>
+            <a:ext cx="10515600" cy="4854190"/>
+          </a:xfrm>
+        </p:spPr>
+        <p:txBody>
+          <a:bodyPr>
+            <a:normAutofit/>
+          </a:bodyPr>
           <a:lstStyle/>
           <a:p>
             <a:r>
@@ -4007,21 +4000,6 @@
               <a:rPr lang="en-US" dirty="0" err="1"/>
               <a:t>hỏi</a:t>
             </a:r>
-            <a:r>
-              <a:rPr lang="en-US" dirty="0"/>
-              <a:t>:</a:t>
-            </a:r>
-          </a:p>
-          <a:p>
-            <a:pPr marL="0" indent="0" algn="ctr">
-              <a:buNone/>
-            </a:pPr>
-            <a:endParaRPr lang="en-US" sz="3200" b="1" dirty="0"/>
-          </a:p>
-          <a:p>
-            <a:pPr marL="0" indent="0" algn="ctr">
-              <a:buNone/>
-            </a:pPr>
             <a:endParaRPr lang="en-US" sz="3200" b="1" dirty="0"/>
           </a:p>
           <a:p>
@@ -4070,7 +4048,7 @@
             </a:r>
             <a:r>
               <a:rPr lang="en-US" sz="3200" b="1" dirty="0" err="1"/>
-              <a:t>thành</a:t>
+              <a:t>Thành</a:t>
             </a:r>
             <a:r>
               <a:rPr lang="en-US" sz="3200" b="1" dirty="0"/>
@@ -4098,6 +4076,202 @@
             </a:r>
             <a:r>
               <a:rPr lang="en-US" sz="3200" b="1" dirty="0"/>
+              <a:t> Minh</a:t>
+            </a:r>
+          </a:p>
+          <a:p>
+            <a:pPr marL="0" indent="0">
+              <a:buNone/>
+            </a:pPr>
+            <a:r>
+              <a:rPr lang="en-US" sz="3200" b="1" dirty="0"/>
+              <a:t>	</a:t>
+            </a:r>
+          </a:p>
+          <a:p>
+            <a:pPr marL="0" indent="0">
+              <a:buNone/>
+            </a:pPr>
+            <a:r>
+              <a:rPr lang="en-US" sz="2400" b="1" dirty="0"/>
+              <a:t>	Input</a:t>
+            </a:r>
+            <a:r>
+              <a:rPr lang="en-US" sz="2400" dirty="0"/>
+              <a:t>: </a:t>
+            </a:r>
+            <a:r>
+              <a:rPr lang="en-US" sz="2400" dirty="0" err="1"/>
+              <a:t>Các</a:t>
+            </a:r>
+            <a:r>
+              <a:rPr lang="en-US" sz="2400" dirty="0"/>
+              <a:t> </a:t>
+            </a:r>
+            <a:r>
+              <a:rPr lang="en-US" sz="2400" dirty="0" err="1"/>
+              <a:t>đặc</a:t>
+            </a:r>
+            <a:r>
+              <a:rPr lang="en-US" sz="2400" dirty="0"/>
+              <a:t> </a:t>
+            </a:r>
+            <a:r>
+              <a:rPr lang="en-US" sz="2400" dirty="0" err="1"/>
+              <a:t>trưng</a:t>
+            </a:r>
+            <a:r>
+              <a:rPr lang="en-US" sz="2400" dirty="0"/>
+              <a:t> </a:t>
+            </a:r>
+            <a:r>
+              <a:rPr lang="en-US" sz="2400" dirty="0" err="1"/>
+              <a:t>của</a:t>
+            </a:r>
+            <a:r>
+              <a:rPr lang="en-US" sz="2400" dirty="0"/>
+              <a:t> </a:t>
+            </a:r>
+            <a:r>
+              <a:rPr lang="en-US" sz="2400" dirty="0" err="1"/>
+              <a:t>ngôi</a:t>
+            </a:r>
+            <a:r>
+              <a:rPr lang="en-US" sz="2400" dirty="0"/>
+              <a:t> </a:t>
+            </a:r>
+            <a:r>
+              <a:rPr lang="en-US" sz="2400" dirty="0" err="1"/>
+              <a:t>nhà</a:t>
+            </a:r>
+            <a:endParaRPr lang="en-US" sz="2400" dirty="0"/>
+          </a:p>
+          <a:p>
+            <a:pPr marL="0" indent="0">
+              <a:buNone/>
+            </a:pPr>
+            <a:r>
+              <a:rPr lang="en-US" sz="2400" b="1" dirty="0"/>
+              <a:t>	Output</a:t>
+            </a:r>
+            <a:r>
+              <a:rPr lang="en-US" sz="2400" dirty="0"/>
+              <a:t>: </a:t>
+            </a:r>
+            <a:r>
+              <a:rPr lang="en-US" sz="2400" dirty="0" err="1"/>
+              <a:t>Giá</a:t>
+            </a:r>
+            <a:r>
+              <a:rPr lang="en-US" sz="2400" dirty="0"/>
+              <a:t> </a:t>
+            </a:r>
+            <a:r>
+              <a:rPr lang="en-US" sz="2400" dirty="0" err="1"/>
+              <a:t>nhà</a:t>
+            </a:r>
+            <a:r>
+              <a:rPr lang="en-US" sz="2400" dirty="0"/>
+              <a:t> </a:t>
+            </a:r>
+            <a:r>
+              <a:rPr lang="en-US" sz="2400" dirty="0" err="1"/>
+              <a:t>dự</a:t>
+            </a:r>
+            <a:r>
+              <a:rPr lang="en-US" sz="2400" dirty="0"/>
+              <a:t> </a:t>
+            </a:r>
+            <a:r>
+              <a:rPr lang="en-US" sz="2400" dirty="0" err="1"/>
+              <a:t>đoán</a:t>
+            </a:r>
+            <a:endParaRPr lang="en-US" sz="2400" dirty="0"/>
+          </a:p>
+          <a:p>
+            <a:pPr marL="0" indent="0">
+              <a:buNone/>
+            </a:pPr>
+            <a:endParaRPr lang="en-US" sz="2400" dirty="0"/>
+          </a:p>
+          <a:p>
+            <a:pPr marL="0" indent="0">
+              <a:buNone/>
+            </a:pPr>
+            <a:endParaRPr lang="en-US" sz="2400" dirty="0"/>
+          </a:p>
+          <a:p>
+            <a:pPr marL="0" indent="0">
+              <a:buNone/>
+            </a:pPr>
+            <a:r>
+              <a:rPr lang="en-US" sz="2400" b="1" dirty="0">
+                <a:sym typeface="Wingdings" panose="05000000000000000000" pitchFamily="2" charset="2"/>
+              </a:rPr>
+              <a:t> </a:t>
+            </a:r>
+            <a:r>
+              <a:rPr lang="vi-VN" sz="2400" b="1" dirty="0"/>
+              <a:t>Lợi ích</a:t>
+            </a:r>
+            <a:r>
+              <a:rPr lang="vi-VN" sz="2400" dirty="0"/>
+              <a:t>: </a:t>
+            </a:r>
+            <a:r>
+              <a:rPr lang="en-US" sz="2400" dirty="0"/>
+              <a:t>Đ</a:t>
+            </a:r>
+            <a:r>
+              <a:rPr lang="vi-VN" sz="2400" dirty="0"/>
+              <a:t>em lại các thông tin cần thiết cho người muốn mua</a:t>
+            </a:r>
+            <a:r>
+              <a:rPr lang="en-US" sz="2400" dirty="0"/>
+              <a:t> (</a:t>
+            </a:r>
+            <a:r>
+              <a:rPr lang="en-US" sz="2400" dirty="0" err="1"/>
+              <a:t>bán</a:t>
+            </a:r>
+            <a:r>
+              <a:rPr lang="en-US" sz="2400" dirty="0"/>
+              <a:t>)</a:t>
+            </a:r>
+            <a:r>
+              <a:rPr lang="vi-VN" sz="2400" dirty="0"/>
+              <a:t> </a:t>
+            </a:r>
+            <a:r>
+              <a:rPr lang="en-US" sz="2400" dirty="0" err="1"/>
+              <a:t>nhà</a:t>
+            </a:r>
+            <a:r>
+              <a:rPr lang="vi-VN" sz="2400" dirty="0"/>
+              <a:t>, muốn tìm hiểu về </a:t>
+            </a:r>
+            <a:r>
+              <a:rPr lang="en-US" sz="2400" dirty="0" err="1"/>
+              <a:t>nhà</a:t>
+            </a:r>
+            <a:r>
+              <a:rPr lang="en-US" sz="2400" dirty="0"/>
+              <a:t> ở TP </a:t>
+            </a:r>
+            <a:r>
+              <a:rPr lang="en-US" sz="2400" dirty="0" err="1"/>
+              <a:t>Hồ</a:t>
+            </a:r>
+            <a:r>
+              <a:rPr lang="en-US" sz="2400" dirty="0"/>
+              <a:t> </a:t>
+            </a:r>
+            <a:r>
+              <a:rPr lang="en-US" sz="2400" dirty="0" err="1"/>
+              <a:t>Chí</a:t>
+            </a:r>
+            <a:r>
+              <a:rPr lang="en-US" sz="2400" dirty="0"/>
               <a:t> Minh</a:t>
             </a:r>
           </a:p>
@@ -4155,13 +4329,20 @@
             <p:ph type="title"/>
           </p:nvPr>
         </p:nvSpPr>
-        <p:spPr/>
-        <p:txBody>
-          <a:bodyPr/>
-          <a:lstStyle/>
-          <a:p>
-            <a:r>
-              <a:rPr lang="en-US" dirty="0"/>
+        <p:spPr>
+          <a:xfrm>
+            <a:off x="838200" y="365126"/>
+            <a:ext cx="10515600" cy="904382"/>
+          </a:xfrm>
+        </p:spPr>
+        <p:txBody>
+          <a:bodyPr>
+            <a:normAutofit/>
+          </a:bodyPr>
+          <a:lstStyle/>
+          <a:p>
+            <a:r>
+              <a:rPr lang="en-US" sz="3600" dirty="0"/>
               <a:t>2. THU THẬP DỮ LIỆU</a:t>
             </a:r>
           </a:p>
@@ -4183,12 +4364,235 @@
             <p:ph idx="1"/>
           </p:nvPr>
         </p:nvSpPr>
-        <p:spPr/>
-        <p:txBody>
-          <a:bodyPr/>
-          <a:lstStyle/>
-          <a:p>
-            <a:endParaRPr lang="en-US"/>
+        <p:spPr>
+          <a:xfrm>
+            <a:off x="838200" y="1269508"/>
+            <a:ext cx="10515600" cy="4907455"/>
+          </a:xfrm>
+        </p:spPr>
+        <p:txBody>
+          <a:bodyPr/>
+          <a:lstStyle/>
+          <a:p>
+            <a:r>
+              <a:rPr lang="en-US" dirty="0" err="1"/>
+              <a:t>Dữ</a:t>
+            </a:r>
+            <a:r>
+              <a:rPr lang="en-US" dirty="0"/>
+              <a:t> </a:t>
+            </a:r>
+            <a:r>
+              <a:rPr lang="en-US" dirty="0" err="1"/>
+              <a:t>liệu</a:t>
+            </a:r>
+            <a:r>
+              <a:rPr lang="en-US" dirty="0"/>
+              <a:t> </a:t>
+            </a:r>
+            <a:r>
+              <a:rPr lang="en-US" dirty="0" err="1"/>
+              <a:t>được</a:t>
+            </a:r>
+            <a:r>
+              <a:rPr lang="en-US" dirty="0"/>
+              <a:t> </a:t>
+            </a:r>
+            <a:r>
+              <a:rPr lang="en-US" dirty="0" err="1"/>
+              <a:t>thu</a:t>
+            </a:r>
+            <a:r>
+              <a:rPr lang="en-US" dirty="0"/>
+              <a:t> </a:t>
+            </a:r>
+            <a:r>
+              <a:rPr lang="en-US" dirty="0" err="1"/>
+              <a:t>thập</a:t>
+            </a:r>
+            <a:r>
+              <a:rPr lang="en-US" dirty="0"/>
+              <a:t> </a:t>
+            </a:r>
+            <a:r>
+              <a:rPr lang="en-US" dirty="0" err="1"/>
+              <a:t>từ</a:t>
+            </a:r>
+            <a:r>
+              <a:rPr lang="en-US" dirty="0"/>
+              <a:t> </a:t>
+            </a:r>
+            <a:r>
+              <a:rPr lang="en-US" dirty="0" err="1"/>
+              <a:t>trang</a:t>
+            </a:r>
+            <a:r>
+              <a:rPr lang="en-US" dirty="0"/>
+              <a:t>:  </a:t>
+            </a:r>
+            <a:r>
+              <a:rPr lang="en-US" dirty="0" err="1">
+                <a:hlinkClick r:id="rId2"/>
+              </a:rPr>
+              <a:t>Rever</a:t>
+            </a:r>
+            <a:r>
+              <a:rPr lang="en-US" dirty="0">
+                <a:hlinkClick r:id="rId2"/>
+              </a:rPr>
+              <a:t> | </a:t>
+            </a:r>
+            <a:r>
+              <a:rPr lang="en-US" dirty="0" err="1">
+                <a:hlinkClick r:id="rId2"/>
+              </a:rPr>
+              <a:t>Mua</a:t>
+            </a:r>
+            <a:r>
+              <a:rPr lang="en-US" dirty="0">
+                <a:hlinkClick r:id="rId2"/>
+              </a:rPr>
+              <a:t> </a:t>
+            </a:r>
+            <a:r>
+              <a:rPr lang="en-US" dirty="0" err="1">
+                <a:hlinkClick r:id="rId2"/>
+              </a:rPr>
+              <a:t>bán</a:t>
+            </a:r>
+            <a:r>
+              <a:rPr lang="en-US" dirty="0">
+                <a:hlinkClick r:id="rId2"/>
+              </a:rPr>
+              <a:t>, </a:t>
+            </a:r>
+            <a:r>
+              <a:rPr lang="en-US" dirty="0" err="1">
+                <a:hlinkClick r:id="rId2"/>
+              </a:rPr>
+              <a:t>cho</a:t>
+            </a:r>
+            <a:r>
+              <a:rPr lang="en-US" dirty="0">
+                <a:hlinkClick r:id="rId2"/>
+              </a:rPr>
+              <a:t> </a:t>
+            </a:r>
+            <a:r>
+              <a:rPr lang="en-US" dirty="0" err="1">
+                <a:hlinkClick r:id="rId2"/>
+              </a:rPr>
+              <a:t>thuê</a:t>
+            </a:r>
+            <a:r>
+              <a:rPr lang="en-US" dirty="0">
+                <a:hlinkClick r:id="rId2"/>
+              </a:rPr>
+              <a:t> </a:t>
+            </a:r>
+            <a:r>
+              <a:rPr lang="en-US" dirty="0" err="1">
+                <a:hlinkClick r:id="rId2"/>
+              </a:rPr>
+              <a:t>nhà</a:t>
+            </a:r>
+            <a:r>
+              <a:rPr lang="en-US" dirty="0">
+                <a:hlinkClick r:id="rId2"/>
+              </a:rPr>
+              <a:t> </a:t>
+            </a:r>
+            <a:r>
+              <a:rPr lang="en-US" dirty="0" err="1">
+                <a:hlinkClick r:id="rId2"/>
+              </a:rPr>
+              <a:t>đất</a:t>
+            </a:r>
+            <a:r>
+              <a:rPr lang="en-US" dirty="0">
+                <a:hlinkClick r:id="rId2"/>
+              </a:rPr>
+              <a:t>, </a:t>
+            </a:r>
+            <a:r>
+              <a:rPr lang="en-US" dirty="0" err="1">
+                <a:hlinkClick r:id="rId2"/>
+              </a:rPr>
+              <a:t>căn</a:t>
+            </a:r>
+            <a:r>
+              <a:rPr lang="en-US" dirty="0">
+                <a:hlinkClick r:id="rId2"/>
+              </a:rPr>
+              <a:t> </a:t>
+            </a:r>
+            <a:r>
+              <a:rPr lang="en-US" dirty="0" err="1">
+                <a:hlinkClick r:id="rId2"/>
+              </a:rPr>
+              <a:t>hộ</a:t>
+            </a:r>
+            <a:r>
+              <a:rPr lang="en-US" dirty="0">
+                <a:hlinkClick r:id="rId2"/>
+              </a:rPr>
+              <a:t>, </a:t>
+            </a:r>
+            <a:r>
+              <a:rPr lang="en-US" dirty="0" err="1">
+                <a:hlinkClick r:id="rId2"/>
+              </a:rPr>
+              <a:t>đất</a:t>
+            </a:r>
+            <a:r>
+              <a:rPr lang="en-US" dirty="0">
+                <a:hlinkClick r:id="rId2"/>
+              </a:rPr>
+              <a:t> </a:t>
+            </a:r>
+            <a:r>
+              <a:rPr lang="en-US" dirty="0" err="1">
+                <a:hlinkClick r:id="rId2"/>
+              </a:rPr>
+              <a:t>nền</a:t>
+            </a:r>
+            <a:r>
+              <a:rPr lang="en-US" dirty="0">
+                <a:hlinkClick r:id="rId2"/>
+              </a:rPr>
+              <a:t> </a:t>
+            </a:r>
+            <a:r>
+              <a:rPr lang="en-US" dirty="0" err="1">
+                <a:hlinkClick r:id="rId2"/>
+              </a:rPr>
+              <a:t>và</a:t>
+            </a:r>
+            <a:r>
+              <a:rPr lang="en-US" dirty="0">
+                <a:hlinkClick r:id="rId2"/>
+              </a:rPr>
+              <a:t> </a:t>
+            </a:r>
+            <a:r>
+              <a:rPr lang="en-US" dirty="0" err="1">
+                <a:hlinkClick r:id="rId2"/>
+              </a:rPr>
+              <a:t>văn</a:t>
+            </a:r>
+            <a:r>
+              <a:rPr lang="en-US" dirty="0">
+                <a:hlinkClick r:id="rId2"/>
+              </a:rPr>
+              <a:t> </a:t>
+            </a:r>
+            <a:r>
+              <a:rPr lang="en-US" dirty="0" err="1">
+                <a:hlinkClick r:id="rId2"/>
+              </a:rPr>
+              <a:t>phòng</a:t>
+            </a:r>
+            <a:endParaRPr lang="en-US" dirty="0"/>
           </a:p>
         </p:txBody>
       </p:sp>
@@ -4240,11 +4644,13 @@
         </p:nvSpPr>
         <p:spPr/>
         <p:txBody>
-          <a:bodyPr/>
-          <a:lstStyle/>
-          <a:p>
-            <a:r>
-              <a:rPr lang="en-US" dirty="0"/>
+          <a:bodyPr>
+            <a:normAutofit/>
+          </a:bodyPr>
+          <a:lstStyle/>
+          <a:p>
+            <a:r>
+              <a:rPr lang="en-US" sz="3600" dirty="0"/>
               <a:t>3. KHÁM PHÁ DỮ LIỆU </a:t>
             </a:r>
           </a:p>

</xml_diff>